<commit_message>
COMP702 weeks 10 and 11
</commit_message>
<xml_diff>
--- a/COMP702/09/2020-21-COMP702-09-lecture-materials.pptx
+++ b/COMP702/09/2020-21-COMP702-09-lecture-materials.pptx
@@ -231,7 +231,7 @@
             <a:fld id="{B9ECC77C-B9D4-426D-95E0-0F8EBBBBB3AC}" type="datetimeFigureOut">
               <a:rPr lang="en-GB" smtClean="0"/>
               <a:pPr/>
-              <a:t>13/11/2020</a:t>
+              <a:t>16/11/2020</a:t>
             </a:fld>
             <a:endParaRPr lang="en-GB"/>
           </a:p>
@@ -746,7 +746,7 @@
             <a:fld id="{5923F103-BC34-4FE4-A40E-EDDEECFDA5D0}" type="datetimeFigureOut">
               <a:rPr lang="en-US" smtClean="0"/>
               <a:pPr/>
-              <a:t>11/13/2020</a:t>
+              <a:t>11/16/2020</a:t>
             </a:fld>
             <a:endParaRPr lang="en-US" dirty="0"/>
           </a:p>
@@ -1009,7 +1009,7 @@
           <a:p>
             <a:fld id="{53086D93-FCAC-47E0-A2EE-787E62CA814C}" type="datetimeFigureOut">
               <a:rPr lang="en-US" smtClean="0"/>
-              <a:t>11/13/2020</a:t>
+              <a:t>11/16/2020</a:t>
             </a:fld>
             <a:endParaRPr lang="en-US" dirty="0"/>
           </a:p>
@@ -1245,7 +1245,7 @@
           <a:p>
             <a:fld id="{CDA879A6-0FD0-4734-A311-86BFCA472E6E}" type="datetimeFigureOut">
               <a:rPr lang="en-US" smtClean="0"/>
-              <a:t>11/13/2020</a:t>
+              <a:t>11/16/2020</a:t>
             </a:fld>
             <a:endParaRPr lang="en-US" dirty="0"/>
           </a:p>
@@ -1486,7 +1486,7 @@
           <a:p>
             <a:fld id="{19C9CA7B-DFD4-44B5-8C60-D14B8CD1FB59}" type="datetimeFigureOut">
               <a:rPr lang="en-US" smtClean="0"/>
-              <a:t>11/13/2020</a:t>
+              <a:t>11/16/2020</a:t>
             </a:fld>
             <a:endParaRPr lang="en-US" dirty="0"/>
           </a:p>
@@ -1794,7 +1794,7 @@
           <a:p>
             <a:fld id="{F34E6425-0181-43F2-84FC-787E803FD2F8}" type="datetimeFigureOut">
               <a:rPr lang="en-US" smtClean="0"/>
-              <a:t>11/13/2020</a:t>
+              <a:t>11/16/2020</a:t>
             </a:fld>
             <a:endParaRPr lang="en-US" dirty="0"/>
           </a:p>
@@ -2097,7 +2097,7 @@
           <a:p>
             <a:fld id="{3BDB8791-F1B0-41E7-B7FD-A781E65C4266}" type="datetimeFigureOut">
               <a:rPr lang="en-US" smtClean="0"/>
-              <a:t>11/13/2020</a:t>
+              <a:t>11/16/2020</a:t>
             </a:fld>
             <a:endParaRPr lang="en-US" dirty="0"/>
           </a:p>
@@ -2520,7 +2520,7 @@
           <a:p>
             <a:fld id="{5FDD63B2-E120-4ED8-B27B-C685F510A5FE}" type="datetimeFigureOut">
               <a:rPr lang="en-US" smtClean="0"/>
-              <a:t>11/13/2020</a:t>
+              <a:t>11/16/2020</a:t>
             </a:fld>
             <a:endParaRPr lang="en-US" dirty="0"/>
           </a:p>
@@ -2683,7 +2683,7 @@
           <a:p>
             <a:fld id="{7AA18ACC-A947-437B-A130-35BD54FDF1E9}" type="datetimeFigureOut">
               <a:rPr lang="en-US" smtClean="0"/>
-              <a:t>11/13/2020</a:t>
+              <a:t>11/16/2020</a:t>
             </a:fld>
             <a:endParaRPr lang="en-US" dirty="0"/>
           </a:p>
@@ -2779,7 +2779,7 @@
           <a:p>
             <a:fld id="{7C8D7E02-BCB8-4D50-A234-369438C08659}" type="datetimeFigureOut">
               <a:rPr lang="en-US" smtClean="0"/>
-              <a:t>11/13/2020</a:t>
+              <a:t>11/16/2020</a:t>
             </a:fld>
             <a:endParaRPr lang="en-US" dirty="0"/>
           </a:p>
@@ -3158,7 +3158,7 @@
           <a:p>
             <a:fld id="{76E86A4C-8E40-4F87-A4F0-01A0687C5742}" type="datetimeFigureOut">
               <a:rPr lang="en-US" smtClean="0"/>
-              <a:t>11/13/2020</a:t>
+              <a:t>11/16/2020</a:t>
             </a:fld>
             <a:endParaRPr lang="en-US" dirty="0"/>
           </a:p>
@@ -3448,7 +3448,7 @@
           <a:p>
             <a:fld id="{35E72C73-2D91-4E12-BA25-F0AA0C03599B}" type="datetimeFigureOut">
               <a:rPr lang="en-US" smtClean="0"/>
-              <a:t>11/13/2020</a:t>
+              <a:t>11/16/2020</a:t>
             </a:fld>
             <a:endParaRPr lang="en-US" dirty="0"/>
           </a:p>
@@ -3660,7 +3660,7 @@
           <a:p>
             <a:fld id="{2BE451C3-0FF4-47C4-B829-773ADF60F88C}" type="datetimeFigureOut">
               <a:rPr lang="en-US" smtClean="0"/>
-              <a:t>11/13/2020</a:t>
+              <a:t>11/16/2020</a:t>
             </a:fld>
             <a:endParaRPr lang="en-US" dirty="0"/>
           </a:p>
@@ -7489,6 +7489,32 @@
           <a:bodyPr/>
           <a:lstStyle/>
           <a:p>
+            <a:pPr marL="0" indent="0">
+              <a:buNone/>
+            </a:pPr>
+            <a:r>
+              <a:rPr lang="en-GB" dirty="0">
+                <a:solidFill>
+                  <a:schemeClr val="tx1"/>
+                </a:solidFill>
+              </a:rPr>
+              <a:t>These are also available on </a:t>
+            </a:r>
+            <a:r>
+              <a:rPr lang="en-GB" dirty="0" err="1">
+                <a:solidFill>
+                  <a:schemeClr val="tx1"/>
+                </a:solidFill>
+              </a:rPr>
+              <a:t>LearningSpace</a:t>
+            </a:r>
+            <a:endParaRPr lang="en-GB" dirty="0">
+              <a:solidFill>
+                <a:schemeClr val="tx1"/>
+              </a:solidFill>
+            </a:endParaRPr>
+          </a:p>
+          <a:p>
             <a:r>
               <a:rPr lang="en-GB" dirty="0">
                 <a:solidFill>
@@ -7574,21 +7600,9 @@
                 <a:solidFill>
                   <a:schemeClr val="tx1"/>
                 </a:solidFill>
-                <a:hlinkClick r:id="rId5">
-                  <a:extLst>
-                    <a:ext uri="{A12FA001-AC4F-418D-AE19-62706E023703}">
-                      <ahyp:hlinkClr xmlns:ahyp="http://schemas.microsoft.com/office/drawing/2018/hyperlinkcolor" val="tx"/>
-                    </a:ext>
-                  </a:extLst>
-                </a:hlinkClick>
               </a:rPr>
               <a:t>https://twitter.com/exutumno</a:t>
             </a:r>
-            <a:endParaRPr lang="en-GB" dirty="0">
-              <a:solidFill>
-                <a:schemeClr val="tx1"/>
-              </a:solidFill>
-            </a:endParaRPr>
           </a:p>
         </p:txBody>
       </p:sp>

</xml_diff>